<commit_message>
final presentation, add conslusion into doc.
</commit_message>
<xml_diff>
--- a/Jozef_Krajčovič.pptx
+++ b/Jozef_Krajčovič.pptx
@@ -209,7 +209,7 @@
             <a:fld id="{417BABF7-0521-4687-9D2B-807B4AABA4E6}" type="datetimeFigureOut">
               <a:rPr lang="sk-SK" smtClean="0"/>
               <a:pPr/>
-              <a:t>29. 11. 2012</a:t>
+              <a:t>5. 12. 2012</a:t>
             </a:fld>
             <a:endParaRPr lang="sk-SK" dirty="0"/>
           </a:p>
@@ -1706,6 +1706,47 @@
               <a:rPr lang="en-US" baseline="0" dirty="0" smtClean="0"/>
               <a:t>  </a:t>
             </a:r>
+          </a:p>
+          <a:p>
+            <a:endParaRPr lang="en-US" baseline="0" dirty="0" smtClean="0"/>
+          </a:p>
+          <a:p>
+            <a:r>
+              <a:rPr lang="en-US" baseline="0" dirty="0" smtClean="0"/>
+              <a:t>- </a:t>
+            </a:r>
+            <a:r>
+              <a:rPr lang="en-US" baseline="0" dirty="0" err="1" smtClean="0"/>
+              <a:t>Podrobnejšie</a:t>
+            </a:r>
+            <a:r>
+              <a:rPr lang="en-US" baseline="0" dirty="0" smtClean="0"/>
+              <a:t>  </a:t>
+            </a:r>
+            <a:r>
+              <a:rPr lang="en-US" baseline="0" dirty="0" err="1" smtClean="0"/>
+              <a:t>ukaže</a:t>
+            </a:r>
+            <a:r>
+              <a:rPr lang="en-US" baseline="0" dirty="0" smtClean="0"/>
+              <a:t> </a:t>
+            </a:r>
+            <a:r>
+              <a:rPr lang="en-US" baseline="0" dirty="0" err="1" smtClean="0"/>
+              <a:t>kolega</a:t>
+            </a:r>
+            <a:r>
+              <a:rPr lang="en-US" baseline="0" dirty="0" smtClean="0"/>
+              <a:t> v </a:t>
+            </a:r>
+            <a:r>
+              <a:rPr lang="en-US" baseline="0" dirty="0" err="1" smtClean="0"/>
+              <a:t>demu</a:t>
+            </a:r>
+            <a:r>
+              <a:rPr lang="en-US" baseline="0" dirty="0" smtClean="0"/>
+              <a:t> … </a:t>
+            </a:r>
             <a:endParaRPr lang="sk-SK" dirty="0" smtClean="0"/>
           </a:p>
           <a:p>
@@ -1792,85 +1833,65 @@
           <a:lstStyle/>
           <a:p>
             <a:r>
-              <a:rPr lang="en-US" dirty="0" err="1" smtClean="0"/>
-              <a:t>Reprezentacia</a:t>
-            </a:r>
-            <a:r>
               <a:rPr lang="en-US" dirty="0" smtClean="0"/>
               <a:t> </a:t>
             </a:r>
             <a:r>
-              <a:rPr lang="en-US" dirty="0" err="1" smtClean="0"/>
-              <a:t>znalosti</a:t>
-            </a:r>
-            <a:r>
-              <a:rPr lang="en-US" dirty="0" smtClean="0"/>
-              <a:t> : </a:t>
-            </a:r>
-          </a:p>
-          <a:p>
-            <a:endParaRPr lang="en-US" dirty="0" smtClean="0"/>
-          </a:p>
-          <a:p>
-            <a:r>
-              <a:rPr lang="en-US" dirty="0" err="1" smtClean="0"/>
-              <a:t>Priklady</a:t>
-            </a:r>
-            <a:r>
-              <a:rPr lang="en-US" dirty="0" smtClean="0"/>
-              <a:t> </a:t>
-            </a:r>
-            <a:r>
-              <a:rPr lang="en-US" dirty="0" err="1" smtClean="0"/>
-              <a:t>na</a:t>
-            </a:r>
-            <a:r>
-              <a:rPr lang="en-US" dirty="0" smtClean="0"/>
-              <a:t> </a:t>
-            </a:r>
-            <a:r>
-              <a:rPr lang="en-US" dirty="0" err="1" smtClean="0"/>
-              <a:t>všetky</a:t>
-            </a:r>
-            <a:r>
-              <a:rPr lang="en-US" baseline="0" dirty="0" smtClean="0"/>
-              <a:t>  </a:t>
-            </a:r>
-            <a:r>
-              <a:rPr lang="en-US" baseline="0" dirty="0" err="1" smtClean="0"/>
-              <a:t>možne</a:t>
-            </a:r>
-            <a:r>
-              <a:rPr lang="en-US" baseline="0" dirty="0" smtClean="0"/>
-              <a:t> </a:t>
-            </a:r>
-            <a:r>
-              <a:rPr lang="en-US" baseline="0" dirty="0" err="1" smtClean="0"/>
-              <a:t>reprezentacie</a:t>
-            </a:r>
-            <a:r>
-              <a:rPr lang="en-US" baseline="0" dirty="0" smtClean="0"/>
-              <a:t> </a:t>
-            </a:r>
-            <a:r>
-              <a:rPr lang="en-US" baseline="0" dirty="0" err="1" smtClean="0"/>
-              <a:t>pravidiel</a:t>
-            </a:r>
-            <a:r>
-              <a:rPr lang="en-US" baseline="0" dirty="0" smtClean="0"/>
-              <a:t> </a:t>
-            </a:r>
-            <a:r>
-              <a:rPr lang="en-US" dirty="0" err="1" smtClean="0"/>
-              <a:t>nejake</a:t>
-            </a:r>
-            <a:r>
-              <a:rPr lang="en-US" dirty="0" smtClean="0"/>
-              <a:t> simple</a:t>
-            </a:r>
-            <a:r>
-              <a:rPr lang="en-US" baseline="0" dirty="0" smtClean="0"/>
-              <a:t>  </a:t>
+              <a:rPr lang="sk-SK" sz="1200" u="sng" kern="1200" dirty="0" err="1" smtClean="0">
+                <a:solidFill>
+                  <a:schemeClr val="tx1"/>
+                </a:solidFill>
+                <a:latin typeface="+mn-lt"/>
+                <a:ea typeface="+mn-ea"/>
+                <a:cs typeface="+mn-cs"/>
+              </a:rPr>
+              <a:t>Inferenčný</a:t>
+            </a:r>
+            <a:r>
+              <a:rPr lang="sk-SK" sz="1200" u="sng" kern="1200" dirty="0" smtClean="0">
+                <a:solidFill>
+                  <a:schemeClr val="tx1"/>
+                </a:solidFill>
+                <a:latin typeface="+mn-lt"/>
+                <a:ea typeface="+mn-ea"/>
+                <a:cs typeface="+mn-cs"/>
+              </a:rPr>
+              <a:t> mechanizmus:</a:t>
+            </a:r>
+            <a:r>
+              <a:rPr lang="sk-SK" sz="1200" kern="1200" dirty="0" smtClean="0">
+                <a:solidFill>
+                  <a:schemeClr val="tx1"/>
+                </a:solidFill>
+                <a:latin typeface="+mn-lt"/>
+                <a:ea typeface="+mn-ea"/>
+                <a:cs typeface="+mn-cs"/>
+              </a:rPr>
+              <a:t>  je založený na doprednom zreťazení, porovnávanie  </a:t>
+            </a:r>
+          </a:p>
+          <a:p>
+            <a:r>
+              <a:rPr lang="sk-SK" sz="1200" kern="1200" dirty="0" smtClean="0">
+                <a:solidFill>
+                  <a:schemeClr val="tx1"/>
+                </a:solidFill>
+                <a:latin typeface="+mn-lt"/>
+                <a:ea typeface="+mn-ea"/>
+                <a:cs typeface="+mn-cs"/>
+              </a:rPr>
+              <a:t>                                            pomocou algoritmu </a:t>
+            </a:r>
+            <a:r>
+              <a:rPr lang="sk-SK" sz="1200" kern="1200" dirty="0" err="1" smtClean="0">
+                <a:solidFill>
+                  <a:schemeClr val="tx1"/>
+                </a:solidFill>
+                <a:latin typeface="+mn-lt"/>
+                <a:ea typeface="+mn-ea"/>
+                <a:cs typeface="+mn-cs"/>
+              </a:rPr>
+              <a:t>Rete</a:t>
             </a:r>
             <a:endParaRPr lang="sk-SK" dirty="0"/>
           </a:p>
@@ -2718,7 +2739,7 @@
             <a:fld id="{10336B07-8511-4DF2-93E1-5665CA9277ED}" type="datetimeFigureOut">
               <a:rPr lang="sk-SK" smtClean="0"/>
               <a:pPr/>
-              <a:t>29. 11. 2012</a:t>
+              <a:t>5. 12. 2012</a:t>
             </a:fld>
             <a:endParaRPr lang="sk-SK" dirty="0"/>
           </a:p>
@@ -2885,7 +2906,7 @@
             <a:fld id="{10336B07-8511-4DF2-93E1-5665CA9277ED}" type="datetimeFigureOut">
               <a:rPr lang="sk-SK" smtClean="0"/>
               <a:pPr/>
-              <a:t>29. 11. 2012</a:t>
+              <a:t>5. 12. 2012</a:t>
             </a:fld>
             <a:endParaRPr lang="sk-SK" dirty="0"/>
           </a:p>
@@ -3062,7 +3083,7 @@
             <a:fld id="{10336B07-8511-4DF2-93E1-5665CA9277ED}" type="datetimeFigureOut">
               <a:rPr lang="sk-SK" smtClean="0"/>
               <a:pPr/>
-              <a:t>29. 11. 2012</a:t>
+              <a:t>5. 12. 2012</a:t>
             </a:fld>
             <a:endParaRPr lang="sk-SK" dirty="0"/>
           </a:p>
@@ -3307,7 +3328,7 @@
                 </a:solidFill>
               </a:rPr>
               <a:pPr/>
-              <a:t>29. 11. 2012</a:t>
+              <a:t>5. 12. 2012</a:t>
             </a:fld>
             <a:endParaRPr lang="sk-SK" dirty="0">
               <a:solidFill>
@@ -3504,7 +3525,7 @@
                 </a:solidFill>
               </a:rPr>
               <a:pPr/>
-              <a:t>29. 11. 2012</a:t>
+              <a:t>5. 12. 2012</a:t>
             </a:fld>
             <a:endParaRPr lang="sk-SK" dirty="0">
               <a:solidFill>
@@ -3777,7 +3798,7 @@
                 </a:solidFill>
               </a:rPr>
               <a:pPr/>
-              <a:t>29. 11. 2012</a:t>
+              <a:t>5. 12. 2012</a:t>
             </a:fld>
             <a:endParaRPr lang="sk-SK" dirty="0">
               <a:solidFill>
@@ -4092,7 +4113,7 @@
                 </a:solidFill>
               </a:rPr>
               <a:pPr/>
-              <a:t>29. 11. 2012</a:t>
+              <a:t>5. 12. 2012</a:t>
             </a:fld>
             <a:endParaRPr lang="sk-SK" dirty="0">
               <a:solidFill>
@@ -4541,7 +4562,7 @@
                 </a:solidFill>
               </a:rPr>
               <a:pPr/>
-              <a:t>29. 11. 2012</a:t>
+              <a:t>5. 12. 2012</a:t>
             </a:fld>
             <a:endParaRPr lang="sk-SK" dirty="0">
               <a:solidFill>
@@ -4686,7 +4707,7 @@
                 </a:solidFill>
               </a:rPr>
               <a:pPr/>
-              <a:t>29. 11. 2012</a:t>
+              <a:t>5. 12. 2012</a:t>
             </a:fld>
             <a:endParaRPr lang="sk-SK" dirty="0">
               <a:solidFill>
@@ -4808,7 +4829,7 @@
                 </a:solidFill>
               </a:rPr>
               <a:pPr/>
-              <a:t>29. 11. 2012</a:t>
+              <a:t>5. 12. 2012</a:t>
             </a:fld>
             <a:endParaRPr lang="sk-SK" dirty="0">
               <a:solidFill>
@@ -5112,7 +5133,7 @@
                 </a:solidFill>
               </a:rPr>
               <a:pPr/>
-              <a:t>29. 11. 2012</a:t>
+              <a:t>5. 12. 2012</a:t>
             </a:fld>
             <a:endParaRPr lang="sk-SK" dirty="0">
               <a:solidFill>
@@ -5303,7 +5324,7 @@
             <a:fld id="{10336B07-8511-4DF2-93E1-5665CA9277ED}" type="datetimeFigureOut">
               <a:rPr lang="sk-SK" smtClean="0"/>
               <a:pPr/>
-              <a:t>29. 11. 2012</a:t>
+              <a:t>5. 12. 2012</a:t>
             </a:fld>
             <a:endParaRPr lang="sk-SK" dirty="0"/>
           </a:p>
@@ -5559,7 +5580,7 @@
                 </a:solidFill>
               </a:rPr>
               <a:pPr/>
-              <a:t>29. 11. 2012</a:t>
+              <a:t>5. 12. 2012</a:t>
             </a:fld>
             <a:endParaRPr lang="sk-SK" dirty="0">
               <a:solidFill>
@@ -5756,7 +5777,7 @@
                 </a:solidFill>
               </a:rPr>
               <a:pPr/>
-              <a:t>29. 11. 2012</a:t>
+              <a:t>5. 12. 2012</a:t>
             </a:fld>
             <a:endParaRPr lang="sk-SK" dirty="0">
               <a:solidFill>
@@ -5963,7 +5984,7 @@
                 </a:solidFill>
               </a:rPr>
               <a:pPr/>
-              <a:t>29. 11. 2012</a:t>
+              <a:t>5. 12. 2012</a:t>
             </a:fld>
             <a:endParaRPr lang="sk-SK" dirty="0">
               <a:solidFill>
@@ -6230,7 +6251,7 @@
             <a:fld id="{10336B07-8511-4DF2-93E1-5665CA9277ED}" type="datetimeFigureOut">
               <a:rPr lang="sk-SK" smtClean="0"/>
               <a:pPr/>
-              <a:t>29. 11. 2012</a:t>
+              <a:t>5. 12. 2012</a:t>
             </a:fld>
             <a:endParaRPr lang="sk-SK" dirty="0"/>
           </a:p>
@@ -6515,7 +6536,7 @@
             <a:fld id="{10336B07-8511-4DF2-93E1-5665CA9277ED}" type="datetimeFigureOut">
               <a:rPr lang="sk-SK" smtClean="0"/>
               <a:pPr/>
-              <a:t>29. 11. 2012</a:t>
+              <a:t>5. 12. 2012</a:t>
             </a:fld>
             <a:endParaRPr lang="sk-SK" dirty="0"/>
           </a:p>
@@ -6939,7 +6960,7 @@
             <a:fld id="{10336B07-8511-4DF2-93E1-5665CA9277ED}" type="datetimeFigureOut">
               <a:rPr lang="sk-SK" smtClean="0"/>
               <a:pPr/>
-              <a:t>29. 11. 2012</a:t>
+              <a:t>5. 12. 2012</a:t>
             </a:fld>
             <a:endParaRPr lang="sk-SK" dirty="0"/>
           </a:p>
@@ -7054,7 +7075,7 @@
             <a:fld id="{10336B07-8511-4DF2-93E1-5665CA9277ED}" type="datetimeFigureOut">
               <a:rPr lang="sk-SK" smtClean="0"/>
               <a:pPr/>
-              <a:t>29. 11. 2012</a:t>
+              <a:t>5. 12. 2012</a:t>
             </a:fld>
             <a:endParaRPr lang="sk-SK" dirty="0"/>
           </a:p>
@@ -7146,7 +7167,7 @@
             <a:fld id="{10336B07-8511-4DF2-93E1-5665CA9277ED}" type="datetimeFigureOut">
               <a:rPr lang="sk-SK" smtClean="0"/>
               <a:pPr/>
-              <a:t>29. 11. 2012</a:t>
+              <a:t>5. 12. 2012</a:t>
             </a:fld>
             <a:endParaRPr lang="sk-SK" dirty="0"/>
           </a:p>
@@ -7420,7 +7441,7 @@
             <a:fld id="{10336B07-8511-4DF2-93E1-5665CA9277ED}" type="datetimeFigureOut">
               <a:rPr lang="sk-SK" smtClean="0"/>
               <a:pPr/>
-              <a:t>29. 11. 2012</a:t>
+              <a:t>5. 12. 2012</a:t>
             </a:fld>
             <a:endParaRPr lang="sk-SK" dirty="0"/>
           </a:p>
@@ -7670,7 +7691,7 @@
             <a:fld id="{10336B07-8511-4DF2-93E1-5665CA9277ED}" type="datetimeFigureOut">
               <a:rPr lang="sk-SK" smtClean="0"/>
               <a:pPr/>
-              <a:t>29. 11. 2012</a:t>
+              <a:t>5. 12. 2012</a:t>
             </a:fld>
             <a:endParaRPr lang="sk-SK" dirty="0"/>
           </a:p>
@@ -7897,7 +7918,7 @@
             <a:fld id="{10336B07-8511-4DF2-93E1-5665CA9277ED}" type="datetimeFigureOut">
               <a:rPr lang="sk-SK" smtClean="0"/>
               <a:pPr/>
-              <a:t>29. 11. 2012</a:t>
+              <a:t>5. 12. 2012</a:t>
             </a:fld>
             <a:endParaRPr lang="sk-SK" dirty="0"/>
           </a:p>
@@ -8427,7 +8448,7 @@
                 </a:solidFill>
               </a:rPr>
               <a:pPr/>
-              <a:t>29. 11. 2012</a:t>
+              <a:t>5. 12. 2012</a:t>
             </a:fld>
             <a:endParaRPr lang="sk-SK" dirty="0">
               <a:solidFill>
@@ -8851,7 +8872,7 @@
   <p:clrMapOvr>
     <a:masterClrMapping/>
   </p:clrMapOvr>
-  <p:transition advTm="8000">
+  <p:transition spd="med" advTm="8000">
     <p:cover/>
   </p:transition>
   <p:timing>
@@ -9040,7 +9061,7 @@
   <p:clrMapOvr>
     <a:masterClrMapping/>
   </p:clrMapOvr>
-  <p:transition>
+  <p:transition spd="med">
     <p:push/>
   </p:transition>
   <p:timing>
@@ -10346,7 +10367,18 @@
                   <a:ea typeface="Segoe UI" pitchFamily="34" charset="0"/>
                   <a:cs typeface="Arial" pitchFamily="34" charset="0"/>
                 </a:rPr>
-                <a:t> ???</a:t>
+                <a:t> </a:t>
+              </a:r>
+              <a:r>
+                <a:rPr lang="en-US" sz="1400" dirty="0" smtClean="0">
+                  <a:solidFill>
+                    <a:srgbClr val="20272A"/>
+                  </a:solidFill>
+                  <a:latin typeface="Arial" pitchFamily="34" charset="0"/>
+                  <a:ea typeface="Segoe UI" pitchFamily="34" charset="0"/>
+                  <a:cs typeface="Arial" pitchFamily="34" charset="0"/>
+                </a:rPr>
+                <a:t>???</a:t>
               </a:r>
               <a:endParaRPr lang="sk-SK" sz="1400" dirty="0">
                 <a:solidFill>
@@ -10605,7 +10637,7 @@
           <p:spPr>
             <a:xfrm>
               <a:off x="1187624" y="915566"/>
-              <a:ext cx="2376264" cy="523220"/>
+              <a:ext cx="2376264" cy="738664"/>
             </a:xfrm>
             <a:prstGeom prst="rect">
               <a:avLst/>
@@ -10708,6 +10740,60 @@
                 </a:rPr>
                 <a:t> … </a:t>
               </a:r>
+              <a:endParaRPr lang="en-US" sz="1400" dirty="0" smtClean="0">
+                <a:solidFill>
+                  <a:srgbClr val="20272A"/>
+                </a:solidFill>
+                <a:latin typeface="Arial" pitchFamily="34" charset="0"/>
+                <a:ea typeface="Segoe UI" pitchFamily="34" charset="0"/>
+                <a:cs typeface="Arial" pitchFamily="34" charset="0"/>
+              </a:endParaRPr>
+            </a:p>
+            <a:p>
+              <a:r>
+                <a:rPr lang="en-US" sz="1400" dirty="0" smtClean="0">
+                  <a:solidFill>
+                    <a:srgbClr val="20272A"/>
+                  </a:solidFill>
+                  <a:latin typeface="Arial" pitchFamily="34" charset="0"/>
+                  <a:ea typeface="Segoe UI" pitchFamily="34" charset="0"/>
+                  <a:cs typeface="Arial" pitchFamily="34" charset="0"/>
+                </a:rPr>
+                <a:t>        </a:t>
+              </a:r>
+              <a:r>
+                <a:rPr lang="en-US" sz="1400" dirty="0" err="1" smtClean="0">
+                  <a:solidFill>
+                    <a:srgbClr val="20272A"/>
+                  </a:solidFill>
+                  <a:latin typeface="Arial" pitchFamily="34" charset="0"/>
+                  <a:ea typeface="Segoe UI" pitchFamily="34" charset="0"/>
+                  <a:cs typeface="Arial" pitchFamily="34" charset="0"/>
+                </a:rPr>
+                <a:t>h</a:t>
+              </a:r>
+              <a:r>
+                <a:rPr lang="en-US" sz="1400" dirty="0" err="1" smtClean="0">
+                  <a:solidFill>
+                    <a:srgbClr val="20272A"/>
+                  </a:solidFill>
+                  <a:latin typeface="Arial" pitchFamily="34" charset="0"/>
+                  <a:ea typeface="Segoe UI" pitchFamily="34" charset="0"/>
+                  <a:cs typeface="Arial" pitchFamily="34" charset="0"/>
+                </a:rPr>
+                <a:t>ej</a:t>
+              </a:r>
+              <a:r>
+                <a:rPr lang="en-US" sz="1400" dirty="0" smtClean="0">
+                  <a:solidFill>
+                    <a:srgbClr val="20272A"/>
+                  </a:solidFill>
+                  <a:latin typeface="Arial" pitchFamily="34" charset="0"/>
+                  <a:ea typeface="Segoe UI" pitchFamily="34" charset="0"/>
+                  <a:cs typeface="Arial" pitchFamily="34" charset="0"/>
+                </a:rPr>
+                <a:t> hop</a:t>
+              </a:r>
               <a:endParaRPr lang="sk-SK" sz="1400" dirty="0">
                 <a:solidFill>
                   <a:srgbClr val="20272A"/>
@@ -10758,6 +10844,9 @@
   <p:clrMapOvr>
     <a:masterClrMapping/>
   </p:clrMapOvr>
+  <p:transition spd="med">
+    <p:push/>
+  </p:transition>
   <p:timing>
     <p:tnLst>
       <p:par>
@@ -11850,8 +11939,8 @@
         </p:nvSpPr>
         <p:spPr>
           <a:xfrm>
-            <a:off x="5292080" y="3867894"/>
-            <a:ext cx="3851920" cy="584775"/>
+            <a:off x="5652120" y="3795886"/>
+            <a:ext cx="2952328" cy="584775"/>
           </a:xfrm>
           <a:prstGeom prst="rect">
             <a:avLst/>
@@ -11876,7 +11965,7 @@
               <a:t>  </a:t>
             </a:r>
             <a:r>
-              <a:rPr lang="en-US" sz="3200" dirty="0" err="1" smtClean="0">
+              <a:rPr lang="en-US" sz="2800" dirty="0" err="1" smtClean="0">
                 <a:solidFill>
                   <a:srgbClr val="20272A"/>
                 </a:solidFill>
@@ -11887,7 +11976,7 @@
               <a:t>ukážka</a:t>
             </a:r>
             <a:r>
-              <a:rPr lang="en-US" sz="3200" dirty="0" smtClean="0">
+              <a:rPr lang="en-US" sz="2800" dirty="0" smtClean="0">
                 <a:solidFill>
                   <a:srgbClr val="20272A"/>
                 </a:solidFill>
@@ -11898,7 +11987,7 @@
               <a:t> </a:t>
             </a:r>
             <a:r>
-              <a:rPr lang="en-US" sz="2800" b="1" dirty="0" err="1" smtClean="0">
+              <a:rPr lang="en-US" sz="2400" b="1" dirty="0" err="1" smtClean="0">
                 <a:solidFill>
                   <a:srgbClr val="851019"/>
                 </a:solidFill>
@@ -11924,7 +12013,7 @@
   <p:clrMapOvr>
     <a:masterClrMapping/>
   </p:clrMapOvr>
-  <p:transition>
+  <p:transition spd="med">
     <p:push/>
   </p:transition>
   <p:timing>
@@ -13047,6 +13136,9 @@
   <p:clrMapOvr>
     <a:masterClrMapping/>
   </p:clrMapOvr>
+  <p:transition spd="med">
+    <p:push/>
+  </p:transition>
   <p:timing>
     <p:tnLst>
       <p:par>
@@ -14001,6 +14093,9 @@
   <p:clrMapOvr>
     <a:masterClrMapping/>
   </p:clrMapOvr>
+  <p:transition spd="med">
+    <p:push/>
+  </p:transition>
   <p:timing>
     <p:tnLst>
       <p:par>
@@ -14481,7 +14576,7 @@
   <p:clrMapOvr>
     <a:masterClrMapping/>
   </p:clrMapOvr>
-  <p:transition advTm="8000">
+  <p:transition spd="med" advTm="8000">
     <p:push/>
   </p:transition>
   <p:timing>
@@ -15009,7 +15104,9 @@
   <p:clrMapOvr>
     <a:masterClrMapping/>
   </p:clrMapOvr>
-  <p:transition advTm="6000"/>
+  <p:transition spd="med" advTm="6000">
+    <p:push/>
+  </p:transition>
   <p:timing>
     <p:tnLst>
       <p:par>
@@ -15410,7 +15507,18 @@
                   <a:ea typeface="Segoe UI" pitchFamily="34" charset="0"/>
                   <a:cs typeface="Arial" pitchFamily="34" charset="0"/>
                 </a:rPr>
-                <a:t>  pre </a:t>
+                <a:t> </a:t>
+              </a:r>
+              <a:r>
+                <a:rPr lang="en-US" sz="2000" dirty="0" smtClean="0">
+                  <a:solidFill>
+                    <a:srgbClr val="20272A"/>
+                  </a:solidFill>
+                  <a:latin typeface="Arial" pitchFamily="34" charset="0"/>
+                  <a:ea typeface="Segoe UI" pitchFamily="34" charset="0"/>
+                  <a:cs typeface="Arial" pitchFamily="34" charset="0"/>
+                </a:rPr>
+                <a:t>pre </a:t>
               </a:r>
               <a:r>
                 <a:rPr lang="en-US" sz="2000" dirty="0" err="1" smtClean="0">
@@ -15434,6 +15542,14 @@
                 </a:rPr>
                 <a:t> </a:t>
               </a:r>
+              <a:endParaRPr lang="en-US" sz="2000" dirty="0" smtClean="0">
+                <a:solidFill>
+                  <a:srgbClr val="20272A"/>
+                </a:solidFill>
+                <a:latin typeface="Arial" pitchFamily="34" charset="0"/>
+                <a:ea typeface="Segoe UI" pitchFamily="34" charset="0"/>
+                <a:cs typeface="Arial" pitchFamily="34" charset="0"/>
+              </a:endParaRPr>
             </a:p>
             <a:p>
               <a:r>
@@ -15484,6 +15600,9 @@
   <p:clrMapOvr>
     <a:masterClrMapping/>
   </p:clrMapOvr>
+  <p:transition spd="med">
+    <p:push/>
+  </p:transition>
   <p:timing>
     <p:tnLst>
       <p:par>
@@ -15691,6 +15810,9 @@
   <p:clrMapOvr>
     <a:masterClrMapping/>
   </p:clrMapOvr>
+  <p:transition spd="med">
+    <p:push/>
+  </p:transition>
   <p:timing>
     <p:tnLst>
       <p:par>
@@ -15814,7 +15936,7 @@
         </p:nvSpPr>
         <p:spPr>
           <a:xfrm>
-            <a:off x="395536" y="1275606"/>
+            <a:off x="575048" y="1357848"/>
             <a:ext cx="8568952" cy="3785652"/>
           </a:xfrm>
           <a:prstGeom prst="rect">
@@ -16239,6 +16361,9 @@
   <p:clrMapOvr>
     <a:masterClrMapping/>
   </p:clrMapOvr>
+  <p:transition spd="med">
+    <p:push/>
+  </p:transition>
   <p:timing>
     <p:tnLst>
       <p:par>
@@ -16274,8 +16399,8 @@
         </p:nvSpPr>
         <p:spPr>
           <a:xfrm>
-            <a:off x="0" y="483518"/>
-            <a:ext cx="3131840" cy="923330"/>
+            <a:off x="179512" y="627534"/>
+            <a:ext cx="3059832" cy="923330"/>
           </a:xfrm>
           <a:prstGeom prst="rect">
             <a:avLst/>
@@ -16340,7 +16465,7 @@
         </p:nvSpPr>
         <p:spPr>
           <a:xfrm>
-            <a:off x="251520" y="0"/>
+            <a:off x="323528" y="123478"/>
             <a:ext cx="3888432" cy="769441"/>
           </a:xfrm>
           <a:prstGeom prst="rect">
@@ -16387,16 +16512,162 @@
           </a:p>
         </p:txBody>
       </p:sp>
-      <p:sp>
-        <p:nvSpPr>
-          <p:cNvPr id="4" name="BlokTextu 3"/>
+      <p:pic>
+        <p:nvPicPr>
+          <p:cNvPr id="5" name="Obrázok 4" descr="1.png"/>
+          <p:cNvPicPr>
+            <a:picLocks noChangeAspect="1"/>
+          </p:cNvPicPr>
+          <p:nvPr/>
+        </p:nvPicPr>
+        <p:blipFill>
+          <a:blip r:embed="rId3" cstate="print"/>
+          <a:stretch>
+            <a:fillRect/>
+          </a:stretch>
+        </p:blipFill>
+        <p:spPr>
+          <a:xfrm>
+            <a:off x="755576" y="2211710"/>
+            <a:ext cx="588846" cy="565678"/>
+          </a:xfrm>
+          <a:prstGeom prst="rect">
+            <a:avLst/>
+          </a:prstGeom>
+        </p:spPr>
+      </p:pic>
+      <p:pic>
+        <p:nvPicPr>
+          <p:cNvPr id="6" name="Obrázok 5" descr="2.png"/>
+          <p:cNvPicPr>
+            <a:picLocks noChangeAspect="1"/>
+          </p:cNvPicPr>
+          <p:nvPr/>
+        </p:nvPicPr>
+        <p:blipFill>
+          <a:blip r:embed="rId4" cstate="print"/>
+          <a:stretch>
+            <a:fillRect/>
+          </a:stretch>
+        </p:blipFill>
+        <p:spPr>
+          <a:xfrm>
+            <a:off x="755576" y="3075806"/>
+            <a:ext cx="587881" cy="565679"/>
+          </a:xfrm>
+          <a:prstGeom prst="rect">
+            <a:avLst/>
+          </a:prstGeom>
+        </p:spPr>
+      </p:pic>
+      <p:pic>
+        <p:nvPicPr>
+          <p:cNvPr id="7" name="Obrázok 6" descr="3.png"/>
+          <p:cNvPicPr>
+            <a:picLocks noChangeAspect="1"/>
+          </p:cNvPicPr>
+          <p:nvPr/>
+        </p:nvPicPr>
+        <p:blipFill>
+          <a:blip r:embed="rId5" cstate="print"/>
+          <a:stretch>
+            <a:fillRect/>
+          </a:stretch>
+        </p:blipFill>
+        <p:spPr>
+          <a:xfrm>
+            <a:off x="755576" y="3939902"/>
+            <a:ext cx="587384" cy="565200"/>
+          </a:xfrm>
+          <a:prstGeom prst="rect">
+            <a:avLst/>
+          </a:prstGeom>
+        </p:spPr>
+      </p:pic>
+      <p:cxnSp>
+        <p:nvCxnSpPr>
+          <p:cNvPr id="8" name="Rovná spojnica 7"/>
+          <p:cNvCxnSpPr/>
+          <p:nvPr/>
+        </p:nvCxnSpPr>
+        <p:spPr>
+          <a:xfrm>
+            <a:off x="1547664" y="2283718"/>
+            <a:ext cx="0" cy="504056"/>
+          </a:xfrm>
+          <a:prstGeom prst="line">
+            <a:avLst/>
+          </a:prstGeom>
+          <a:ln>
+            <a:solidFill>
+              <a:schemeClr val="bg1">
+                <a:lumMod val="50000"/>
+              </a:schemeClr>
+            </a:solidFill>
+          </a:ln>
+        </p:spPr>
+        <p:style>
+          <a:lnRef idx="1">
+            <a:schemeClr val="accent1"/>
+          </a:lnRef>
+          <a:fillRef idx="0">
+            <a:schemeClr val="accent1"/>
+          </a:fillRef>
+          <a:effectRef idx="0">
+            <a:schemeClr val="accent1"/>
+          </a:effectRef>
+          <a:fontRef idx="minor">
+            <a:schemeClr val="tx1"/>
+          </a:fontRef>
+        </p:style>
+      </p:cxnSp>
+      <p:cxnSp>
+        <p:nvCxnSpPr>
+          <p:cNvPr id="9" name="Rovná spojnica 8"/>
+          <p:cNvCxnSpPr/>
+          <p:nvPr/>
+        </p:nvCxnSpPr>
+        <p:spPr>
+          <a:xfrm>
+            <a:off x="1547664" y="3147814"/>
+            <a:ext cx="0" cy="504056"/>
+          </a:xfrm>
+          <a:prstGeom prst="line">
+            <a:avLst/>
+          </a:prstGeom>
+          <a:ln>
+            <a:solidFill>
+              <a:schemeClr val="bg1">
+                <a:lumMod val="50000"/>
+              </a:schemeClr>
+            </a:solidFill>
+          </a:ln>
+        </p:spPr>
+        <p:style>
+          <a:lnRef idx="1">
+            <a:schemeClr val="accent1"/>
+          </a:lnRef>
+          <a:fillRef idx="0">
+            <a:schemeClr val="accent1"/>
+          </a:fillRef>
+          <a:effectRef idx="0">
+            <a:schemeClr val="accent1"/>
+          </a:effectRef>
+          <a:fontRef idx="minor">
+            <a:schemeClr val="tx1"/>
+          </a:fontRef>
+        </p:style>
+      </p:cxnSp>
+      <p:sp>
+        <p:nvSpPr>
+          <p:cNvPr id="14" name="BlokTextu 13"/>
           <p:cNvSpPr txBox="1"/>
           <p:nvPr/>
         </p:nvSpPr>
         <p:spPr>
           <a:xfrm>
-            <a:off x="179512" y="1851670"/>
-            <a:ext cx="8568952" cy="1200329"/>
+            <a:off x="1691680" y="2283718"/>
+            <a:ext cx="2805576" cy="461665"/>
           </a:xfrm>
           <a:prstGeom prst="rect">
             <a:avLst/>
@@ -16404,74 +16675,300 @@
           <a:noFill/>
         </p:spPr>
         <p:txBody>
-          <a:bodyPr wrap="square" rtlCol="0">
+          <a:bodyPr wrap="none" rtlCol="0">
             <a:spAutoFit/>
           </a:bodyPr>
           <a:lstStyle/>
           <a:p>
             <a:r>
+              <a:rPr lang="en-US" sz="2400" dirty="0" err="1" smtClean="0">
+                <a:solidFill>
+                  <a:srgbClr val="20272A"/>
+                </a:solidFill>
+                <a:latin typeface="Arial" pitchFamily="34" charset="0"/>
+                <a:cs typeface="Arial" pitchFamily="34" charset="0"/>
+              </a:rPr>
+              <a:t>Pomocou</a:t>
+            </a:r>
+            <a:r>
               <a:rPr lang="en-US" sz="2400" dirty="0" smtClean="0">
                 <a:solidFill>
                   <a:srgbClr val="20272A"/>
                 </a:solidFill>
                 <a:latin typeface="Arial" pitchFamily="34" charset="0"/>
-                <a:ea typeface="KaiTi" pitchFamily="49" charset="-122"/>
-                <a:cs typeface="Arial" pitchFamily="34" charset="0"/>
-              </a:rPr>
-              <a:t>…</a:t>
-            </a:r>
-            <a:endParaRPr lang="en-US" sz="2400" dirty="0" smtClean="0">
-              <a:solidFill>
-                <a:schemeClr val="bg1">
-                  <a:lumMod val="50000"/>
-                </a:schemeClr>
-              </a:solidFill>
-              <a:latin typeface="Arial" pitchFamily="34" charset="0"/>
-              <a:ea typeface="KaiTi" pitchFamily="49" charset="-122"/>
-              <a:cs typeface="Arial" pitchFamily="34" charset="0"/>
-            </a:endParaRPr>
-          </a:p>
-          <a:p>
+                <a:cs typeface="Arial" pitchFamily="34" charset="0"/>
+              </a:rPr>
+              <a:t> </a:t>
+            </a:r>
+            <a:r>
+              <a:rPr lang="en-US" sz="2400" dirty="0" err="1" smtClean="0">
+                <a:solidFill>
+                  <a:srgbClr val="20272A"/>
+                </a:solidFill>
+                <a:latin typeface="Arial" pitchFamily="34" charset="0"/>
+                <a:cs typeface="Arial" pitchFamily="34" charset="0"/>
+              </a:rPr>
+              <a:t>pravidiel</a:t>
+            </a:r>
             <a:r>
               <a:rPr lang="en-US" sz="2400" dirty="0" smtClean="0">
                 <a:solidFill>
                   <a:srgbClr val="20272A"/>
                 </a:solidFill>
                 <a:latin typeface="Arial" pitchFamily="34" charset="0"/>
-                <a:ea typeface="KaiTi" pitchFamily="49" charset="-122"/>
                 <a:cs typeface="Arial" pitchFamily="34" charset="0"/>
               </a:rPr>
               <a:t> </a:t>
             </a:r>
-          </a:p>
-          <a:p>
-            <a:r>
-              <a:rPr lang="en-US" sz="2400" dirty="0" smtClean="0">
-                <a:solidFill>
-                  <a:srgbClr val="20272A"/>
-                </a:solidFill>
-                <a:latin typeface="Arial" pitchFamily="34" charset="0"/>
-                <a:ea typeface="KaiTi" pitchFamily="49" charset="-122"/>
-                <a:cs typeface="Arial" pitchFamily="34" charset="0"/>
-              </a:rPr>
-              <a:t> </a:t>
-            </a:r>
-            <a:endParaRPr lang="en-US" sz="1400" dirty="0" smtClean="0">
+            <a:endParaRPr lang="sk-SK" sz="2400" dirty="0">
               <a:solidFill>
                 <a:srgbClr val="20272A"/>
               </a:solidFill>
               <a:latin typeface="Arial" pitchFamily="34" charset="0"/>
-              <a:ea typeface="KaiTi" pitchFamily="49" charset="-122"/>
               <a:cs typeface="Arial" pitchFamily="34" charset="0"/>
             </a:endParaRPr>
           </a:p>
         </p:txBody>
       </p:sp>
+      <p:sp>
+        <p:nvSpPr>
+          <p:cNvPr id="16" name="BlokTextu 15"/>
+          <p:cNvSpPr txBox="1"/>
+          <p:nvPr/>
+        </p:nvSpPr>
+        <p:spPr>
+          <a:xfrm>
+            <a:off x="1691680" y="3147814"/>
+            <a:ext cx="4035079" cy="461665"/>
+          </a:xfrm>
+          <a:prstGeom prst="rect">
+            <a:avLst/>
+          </a:prstGeom>
+          <a:noFill/>
+        </p:spPr>
+        <p:txBody>
+          <a:bodyPr wrap="none" rtlCol="0">
+            <a:spAutoFit/>
+          </a:bodyPr>
+          <a:lstStyle/>
+          <a:p>
+            <a:r>
+              <a:rPr lang="en-US" sz="2400" dirty="0" err="1" smtClean="0">
+                <a:solidFill>
+                  <a:srgbClr val="20272A"/>
+                </a:solidFill>
+                <a:latin typeface="Arial" pitchFamily="34" charset="0"/>
+                <a:cs typeface="Arial" pitchFamily="34" charset="0"/>
+              </a:rPr>
+              <a:t>Pomocou</a:t>
+            </a:r>
+            <a:r>
+              <a:rPr lang="en-US" sz="2400" dirty="0" smtClean="0">
+                <a:solidFill>
+                  <a:srgbClr val="20272A"/>
+                </a:solidFill>
+                <a:latin typeface="Arial" pitchFamily="34" charset="0"/>
+                <a:cs typeface="Arial" pitchFamily="34" charset="0"/>
+              </a:rPr>
+              <a:t> </a:t>
+            </a:r>
+            <a:r>
+              <a:rPr lang="en-US" sz="2400" dirty="0" err="1" smtClean="0">
+                <a:solidFill>
+                  <a:srgbClr val="20272A"/>
+                </a:solidFill>
+                <a:latin typeface="Arial" pitchFamily="34" charset="0"/>
+                <a:cs typeface="Arial" pitchFamily="34" charset="0"/>
+              </a:rPr>
+              <a:t>funkcií</a:t>
+            </a:r>
+            <a:r>
+              <a:rPr lang="en-US" sz="2400" dirty="0" smtClean="0">
+                <a:solidFill>
+                  <a:srgbClr val="20272A"/>
+                </a:solidFill>
+                <a:latin typeface="Arial" pitchFamily="34" charset="0"/>
+                <a:cs typeface="Arial" pitchFamily="34" charset="0"/>
+              </a:rPr>
+              <a:t> a </a:t>
+            </a:r>
+            <a:r>
+              <a:rPr lang="en-US" sz="2400" dirty="0" err="1" smtClean="0">
+                <a:solidFill>
+                  <a:srgbClr val="20272A"/>
+                </a:solidFill>
+                <a:latin typeface="Arial" pitchFamily="34" charset="0"/>
+                <a:cs typeface="Arial" pitchFamily="34" charset="0"/>
+              </a:rPr>
+              <a:t>objektov</a:t>
+            </a:r>
+            <a:r>
+              <a:rPr lang="en-US" sz="2400" dirty="0" smtClean="0">
+                <a:solidFill>
+                  <a:srgbClr val="20272A"/>
+                </a:solidFill>
+                <a:latin typeface="Arial" pitchFamily="34" charset="0"/>
+                <a:cs typeface="Arial" pitchFamily="34" charset="0"/>
+              </a:rPr>
+              <a:t> </a:t>
+            </a:r>
+            <a:endParaRPr lang="sk-SK" sz="2400" dirty="0">
+              <a:solidFill>
+                <a:srgbClr val="20272A"/>
+              </a:solidFill>
+              <a:latin typeface="Arial" pitchFamily="34" charset="0"/>
+              <a:cs typeface="Arial" pitchFamily="34" charset="0"/>
+            </a:endParaRPr>
+          </a:p>
+        </p:txBody>
+      </p:sp>
+      <p:sp>
+        <p:nvSpPr>
+          <p:cNvPr id="17" name="BlokTextu 16"/>
+          <p:cNvSpPr txBox="1"/>
+          <p:nvPr/>
+        </p:nvSpPr>
+        <p:spPr>
+          <a:xfrm>
+            <a:off x="1691680" y="4011910"/>
+            <a:ext cx="4303999" cy="461665"/>
+          </a:xfrm>
+          <a:prstGeom prst="rect">
+            <a:avLst/>
+          </a:prstGeom>
+          <a:noFill/>
+        </p:spPr>
+        <p:txBody>
+          <a:bodyPr wrap="none" rtlCol="0">
+            <a:spAutoFit/>
+          </a:bodyPr>
+          <a:lstStyle/>
+          <a:p>
+            <a:r>
+              <a:rPr lang="en-US" sz="2400" dirty="0" smtClean="0">
+                <a:solidFill>
+                  <a:srgbClr val="20272A"/>
+                </a:solidFill>
+                <a:latin typeface="Arial" pitchFamily="34" charset="0"/>
+                <a:cs typeface="Arial" pitchFamily="34" charset="0"/>
+              </a:rPr>
+              <a:t>Mix (</a:t>
+            </a:r>
+            <a:r>
+              <a:rPr lang="en-US" sz="2400" dirty="0" err="1" smtClean="0">
+                <a:solidFill>
+                  <a:srgbClr val="20272A"/>
+                </a:solidFill>
+                <a:latin typeface="Arial" pitchFamily="34" charset="0"/>
+                <a:cs typeface="Arial" pitchFamily="34" charset="0"/>
+              </a:rPr>
+              <a:t>pravidlá</a:t>
+            </a:r>
+            <a:r>
+              <a:rPr lang="en-US" sz="2400" dirty="0" smtClean="0">
+                <a:solidFill>
+                  <a:srgbClr val="20272A"/>
+                </a:solidFill>
+                <a:latin typeface="Arial" pitchFamily="34" charset="0"/>
+                <a:cs typeface="Arial" pitchFamily="34" charset="0"/>
+              </a:rPr>
+              <a:t>, </a:t>
+            </a:r>
+            <a:r>
+              <a:rPr lang="en-US" sz="2400" dirty="0" err="1" smtClean="0">
+                <a:solidFill>
+                  <a:srgbClr val="20272A"/>
+                </a:solidFill>
+                <a:latin typeface="Arial" pitchFamily="34" charset="0"/>
+                <a:cs typeface="Arial" pitchFamily="34" charset="0"/>
+              </a:rPr>
+              <a:t>objekty</a:t>
+            </a:r>
+            <a:r>
+              <a:rPr lang="en-US" sz="2400" dirty="0" smtClean="0">
+                <a:solidFill>
+                  <a:srgbClr val="20272A"/>
+                </a:solidFill>
+                <a:latin typeface="Arial" pitchFamily="34" charset="0"/>
+                <a:cs typeface="Arial" pitchFamily="34" charset="0"/>
+              </a:rPr>
+              <a:t>, </a:t>
+            </a:r>
+            <a:r>
+              <a:rPr lang="en-US" sz="2400" dirty="0" err="1" smtClean="0">
+                <a:solidFill>
+                  <a:srgbClr val="20272A"/>
+                </a:solidFill>
+                <a:latin typeface="Arial" pitchFamily="34" charset="0"/>
+                <a:cs typeface="Arial" pitchFamily="34" charset="0"/>
+              </a:rPr>
+              <a:t>funkcie</a:t>
+            </a:r>
+            <a:r>
+              <a:rPr lang="en-US" sz="2400" dirty="0" smtClean="0">
+                <a:solidFill>
+                  <a:srgbClr val="20272A"/>
+                </a:solidFill>
+                <a:latin typeface="Arial" pitchFamily="34" charset="0"/>
+                <a:cs typeface="Arial" pitchFamily="34" charset="0"/>
+              </a:rPr>
+              <a:t>)</a:t>
+            </a:r>
+            <a:endParaRPr lang="sk-SK" sz="2400" dirty="0">
+              <a:solidFill>
+                <a:srgbClr val="20272A"/>
+              </a:solidFill>
+              <a:latin typeface="Arial" pitchFamily="34" charset="0"/>
+              <a:cs typeface="Arial" pitchFamily="34" charset="0"/>
+            </a:endParaRPr>
+          </a:p>
+        </p:txBody>
+      </p:sp>
+      <p:cxnSp>
+        <p:nvCxnSpPr>
+          <p:cNvPr id="18" name="Rovná spojnica 17"/>
+          <p:cNvCxnSpPr/>
+          <p:nvPr/>
+        </p:nvCxnSpPr>
+        <p:spPr>
+          <a:xfrm>
+            <a:off x="1547664" y="4011910"/>
+            <a:ext cx="0" cy="504056"/>
+          </a:xfrm>
+          <a:prstGeom prst="line">
+            <a:avLst/>
+          </a:prstGeom>
+          <a:ln>
+            <a:solidFill>
+              <a:schemeClr val="bg1">
+                <a:lumMod val="50000"/>
+              </a:schemeClr>
+            </a:solidFill>
+          </a:ln>
+        </p:spPr>
+        <p:style>
+          <a:lnRef idx="1">
+            <a:schemeClr val="accent1"/>
+          </a:lnRef>
+          <a:fillRef idx="0">
+            <a:schemeClr val="accent1"/>
+          </a:fillRef>
+          <a:effectRef idx="0">
+            <a:schemeClr val="accent1"/>
+          </a:effectRef>
+          <a:fontRef idx="minor">
+            <a:schemeClr val="tx1"/>
+          </a:fontRef>
+        </p:style>
+      </p:cxnSp>
     </p:spTree>
   </p:cSld>
   <p:clrMapOvr>
     <a:masterClrMapping/>
   </p:clrMapOvr>
+  <p:transition spd="med">
+    <p:push/>
+  </p:transition>
   <p:timing>
     <p:tnLst>
       <p:par>
@@ -16499,11 +16996,292 @@
           <a:chExt cx="0" cy="0"/>
         </a:xfrm>
       </p:grpSpPr>
+      <p:sp>
+        <p:nvSpPr>
+          <p:cNvPr id="2" name="BlokTextu 1"/>
+          <p:cNvSpPr txBox="1"/>
+          <p:nvPr/>
+        </p:nvSpPr>
+        <p:spPr>
+          <a:xfrm>
+            <a:off x="1115616" y="195486"/>
+            <a:ext cx="3888432" cy="769441"/>
+          </a:xfrm>
+          <a:prstGeom prst="rect">
+            <a:avLst/>
+          </a:prstGeom>
+          <a:noFill/>
+        </p:spPr>
+        <p:txBody>
+          <a:bodyPr wrap="square" rtlCol="0">
+            <a:spAutoFit/>
+          </a:bodyPr>
+          <a:lstStyle/>
+          <a:p>
+            <a:r>
+              <a:rPr lang="en-US" sz="4400" dirty="0" err="1" smtClean="0">
+                <a:solidFill>
+                  <a:srgbClr val="20272A"/>
+                </a:solidFill>
+                <a:latin typeface="Arial" pitchFamily="34" charset="0"/>
+                <a:ea typeface="KaiTi" pitchFamily="49" charset="-122"/>
+                <a:cs typeface="Arial" pitchFamily="34" charset="0"/>
+              </a:rPr>
+              <a:t>Interferenčný</a:t>
+            </a:r>
+            <a:r>
+              <a:rPr lang="en-US" sz="4400" dirty="0" smtClean="0">
+                <a:solidFill>
+                  <a:srgbClr val="20272A"/>
+                </a:solidFill>
+                <a:latin typeface="Arial" pitchFamily="34" charset="0"/>
+                <a:ea typeface="KaiTi" pitchFamily="49" charset="-122"/>
+                <a:cs typeface="Arial" pitchFamily="34" charset="0"/>
+              </a:rPr>
+              <a:t> </a:t>
+            </a:r>
+            <a:endParaRPr lang="en-US" sz="2800" dirty="0" smtClean="0">
+              <a:solidFill>
+                <a:srgbClr val="20272A"/>
+              </a:solidFill>
+              <a:latin typeface="Arial" pitchFamily="34" charset="0"/>
+              <a:ea typeface="KaiTi" pitchFamily="49" charset="-122"/>
+              <a:cs typeface="Arial" pitchFamily="34" charset="0"/>
+            </a:endParaRPr>
+          </a:p>
+        </p:txBody>
+      </p:sp>
+      <p:sp>
+        <p:nvSpPr>
+          <p:cNvPr id="3" name="BlokTextu 2"/>
+          <p:cNvSpPr txBox="1"/>
+          <p:nvPr/>
+        </p:nvSpPr>
+        <p:spPr>
+          <a:xfrm>
+            <a:off x="2483768" y="699542"/>
+            <a:ext cx="4752528" cy="923330"/>
+          </a:xfrm>
+          <a:prstGeom prst="rect">
+            <a:avLst/>
+          </a:prstGeom>
+          <a:noFill/>
+        </p:spPr>
+        <p:txBody>
+          <a:bodyPr wrap="square" rtlCol="0">
+            <a:spAutoFit/>
+          </a:bodyPr>
+          <a:lstStyle/>
+          <a:p>
+            <a:r>
+              <a:rPr lang="en-US" sz="5400" b="1" dirty="0" err="1" smtClean="0">
+                <a:solidFill>
+                  <a:srgbClr val="851019"/>
+                </a:solidFill>
+                <a:latin typeface="Arial" pitchFamily="34" charset="0"/>
+                <a:ea typeface="KaiTi" pitchFamily="49" charset="-122"/>
+                <a:cs typeface="Arial" pitchFamily="34" charset="0"/>
+              </a:rPr>
+              <a:t>machanizmus</a:t>
+            </a:r>
+            <a:endParaRPr lang="sk-SK" sz="5400" b="1" dirty="0">
+              <a:solidFill>
+                <a:srgbClr val="851019"/>
+              </a:solidFill>
+              <a:latin typeface="Arial" pitchFamily="34" charset="0"/>
+              <a:ea typeface="KaiTi" pitchFamily="49" charset="-122"/>
+              <a:cs typeface="Arial" pitchFamily="34" charset="0"/>
+            </a:endParaRPr>
+          </a:p>
+        </p:txBody>
+      </p:sp>
+      <p:sp>
+        <p:nvSpPr>
+          <p:cNvPr id="4" name="BlokTextu 3"/>
+          <p:cNvSpPr txBox="1"/>
+          <p:nvPr/>
+        </p:nvSpPr>
+        <p:spPr>
+          <a:xfrm>
+            <a:off x="0" y="2859782"/>
+            <a:ext cx="8568952" cy="1323439"/>
+          </a:xfrm>
+          <a:prstGeom prst="rect">
+            <a:avLst/>
+          </a:prstGeom>
+          <a:noFill/>
+        </p:spPr>
+        <p:txBody>
+          <a:bodyPr wrap="square" rtlCol="0">
+            <a:spAutoFit/>
+          </a:bodyPr>
+          <a:lstStyle/>
+          <a:p>
+            <a:pPr algn="ctr"/>
+            <a:r>
+              <a:rPr lang="en-US" sz="2800" dirty="0" err="1" smtClean="0">
+                <a:solidFill>
+                  <a:srgbClr val="20272A"/>
+                </a:solidFill>
+                <a:latin typeface="Arial" pitchFamily="34" charset="0"/>
+                <a:ea typeface="KaiTi" pitchFamily="49" charset="-122"/>
+                <a:cs typeface="Arial" pitchFamily="34" charset="0"/>
+              </a:rPr>
+              <a:t>Klasika</a:t>
+            </a:r>
+            <a:r>
+              <a:rPr lang="en-US" sz="2800" dirty="0" smtClean="0">
+                <a:solidFill>
+                  <a:srgbClr val="20272A"/>
+                </a:solidFill>
+                <a:latin typeface="Arial" pitchFamily="34" charset="0"/>
+                <a:ea typeface="KaiTi" pitchFamily="49" charset="-122"/>
+                <a:cs typeface="Arial" pitchFamily="34" charset="0"/>
+              </a:rPr>
+              <a:t> – </a:t>
+            </a:r>
+            <a:r>
+              <a:rPr lang="en-US" sz="2800" dirty="0" err="1" smtClean="0">
+                <a:solidFill>
+                  <a:srgbClr val="20272A"/>
+                </a:solidFill>
+                <a:latin typeface="Arial" pitchFamily="34" charset="0"/>
+                <a:ea typeface="KaiTi" pitchFamily="49" charset="-122"/>
+                <a:cs typeface="Arial" pitchFamily="34" charset="0"/>
+              </a:rPr>
+              <a:t>založený</a:t>
+            </a:r>
+            <a:r>
+              <a:rPr lang="en-US" sz="2800" dirty="0" smtClean="0">
+                <a:solidFill>
+                  <a:srgbClr val="20272A"/>
+                </a:solidFill>
+                <a:latin typeface="Arial" pitchFamily="34" charset="0"/>
+                <a:ea typeface="KaiTi" pitchFamily="49" charset="-122"/>
+                <a:cs typeface="Arial" pitchFamily="34" charset="0"/>
+              </a:rPr>
+              <a:t> </a:t>
+            </a:r>
+            <a:r>
+              <a:rPr lang="en-US" sz="2800" dirty="0" err="1" smtClean="0">
+                <a:solidFill>
+                  <a:srgbClr val="20272A"/>
+                </a:solidFill>
+                <a:latin typeface="Arial" pitchFamily="34" charset="0"/>
+                <a:ea typeface="KaiTi" pitchFamily="49" charset="-122"/>
+                <a:cs typeface="Arial" pitchFamily="34" charset="0"/>
+              </a:rPr>
+              <a:t>na</a:t>
+            </a:r>
+            <a:r>
+              <a:rPr lang="en-US" sz="2800" dirty="0" smtClean="0">
+                <a:solidFill>
+                  <a:srgbClr val="20272A"/>
+                </a:solidFill>
+                <a:latin typeface="Arial" pitchFamily="34" charset="0"/>
+                <a:ea typeface="KaiTi" pitchFamily="49" charset="-122"/>
+                <a:cs typeface="Arial" pitchFamily="34" charset="0"/>
+              </a:rPr>
+              <a:t> doprednom </a:t>
+            </a:r>
+            <a:r>
+              <a:rPr lang="en-US" sz="2800" dirty="0" err="1" smtClean="0">
+                <a:solidFill>
+                  <a:srgbClr val="20272A"/>
+                </a:solidFill>
+                <a:latin typeface="Arial" pitchFamily="34" charset="0"/>
+                <a:ea typeface="KaiTi" pitchFamily="49" charset="-122"/>
+                <a:cs typeface="Arial" pitchFamily="34" charset="0"/>
+              </a:rPr>
+              <a:t>zreťazení</a:t>
+            </a:r>
+            <a:r>
+              <a:rPr lang="en-US" sz="2800" dirty="0" smtClean="0">
+                <a:solidFill>
+                  <a:srgbClr val="20272A"/>
+                </a:solidFill>
+                <a:latin typeface="Arial" pitchFamily="34" charset="0"/>
+                <a:ea typeface="KaiTi" pitchFamily="49" charset="-122"/>
+                <a:cs typeface="Arial" pitchFamily="34" charset="0"/>
+              </a:rPr>
+              <a:t>, </a:t>
+            </a:r>
+            <a:r>
+              <a:rPr lang="en-US" sz="2800" dirty="0" err="1" smtClean="0">
+                <a:solidFill>
+                  <a:srgbClr val="20272A"/>
+                </a:solidFill>
+                <a:latin typeface="Arial" pitchFamily="34" charset="0"/>
+                <a:ea typeface="KaiTi" pitchFamily="49" charset="-122"/>
+                <a:cs typeface="Arial" pitchFamily="34" charset="0"/>
+              </a:rPr>
+              <a:t>používa</a:t>
+            </a:r>
+            <a:r>
+              <a:rPr lang="en-US" sz="2800" dirty="0" smtClean="0">
+                <a:solidFill>
+                  <a:srgbClr val="20272A"/>
+                </a:solidFill>
+                <a:latin typeface="Arial" pitchFamily="34" charset="0"/>
+                <a:ea typeface="KaiTi" pitchFamily="49" charset="-122"/>
+                <a:cs typeface="Arial" pitchFamily="34" charset="0"/>
+              </a:rPr>
+              <a:t> </a:t>
+            </a:r>
+            <a:r>
+              <a:rPr lang="en-US" sz="2800" dirty="0" err="1" smtClean="0">
+                <a:solidFill>
+                  <a:srgbClr val="20272A"/>
+                </a:solidFill>
+                <a:latin typeface="Arial" pitchFamily="34" charset="0"/>
+                <a:ea typeface="KaiTi" pitchFamily="49" charset="-122"/>
+                <a:cs typeface="Arial" pitchFamily="34" charset="0"/>
+              </a:rPr>
+              <a:t>algoritmus</a:t>
+            </a:r>
+            <a:r>
+              <a:rPr lang="en-US" sz="2800" dirty="0" smtClean="0">
+                <a:solidFill>
+                  <a:srgbClr val="20272A"/>
+                </a:solidFill>
+                <a:latin typeface="Arial" pitchFamily="34" charset="0"/>
+                <a:ea typeface="KaiTi" pitchFamily="49" charset="-122"/>
+                <a:cs typeface="Arial" pitchFamily="34" charset="0"/>
+              </a:rPr>
+              <a:t> RETE </a:t>
+            </a:r>
+          </a:p>
+          <a:p>
+            <a:r>
+              <a:rPr lang="en-US" sz="2400" dirty="0" smtClean="0">
+                <a:solidFill>
+                  <a:srgbClr val="20272A"/>
+                </a:solidFill>
+                <a:latin typeface="Arial" pitchFamily="34" charset="0"/>
+                <a:ea typeface="KaiTi" pitchFamily="49" charset="-122"/>
+                <a:cs typeface="Arial" pitchFamily="34" charset="0"/>
+              </a:rPr>
+              <a:t> </a:t>
+            </a:r>
+            <a:endParaRPr lang="en-US" sz="1400" dirty="0" smtClean="0">
+              <a:solidFill>
+                <a:srgbClr val="20272A"/>
+              </a:solidFill>
+              <a:latin typeface="Arial" pitchFamily="34" charset="0"/>
+              <a:ea typeface="KaiTi" pitchFamily="49" charset="-122"/>
+              <a:cs typeface="Arial" pitchFamily="34" charset="0"/>
+            </a:endParaRPr>
+          </a:p>
+        </p:txBody>
+      </p:sp>
     </p:spTree>
   </p:cSld>
   <p:clrMapOvr>
     <a:masterClrMapping/>
   </p:clrMapOvr>
+  <p:transition spd="med">
+    <p:push/>
+  </p:transition>
   <p:timing>
     <p:tnLst>
       <p:par>
@@ -16531,11 +17309,467 @@
           <a:chExt cx="0" cy="0"/>
         </a:xfrm>
       </p:grpSpPr>
+      <p:sp>
+        <p:nvSpPr>
+          <p:cNvPr id="2" name="BlokTextu 1"/>
+          <p:cNvSpPr txBox="1"/>
+          <p:nvPr/>
+        </p:nvSpPr>
+        <p:spPr>
+          <a:xfrm>
+            <a:off x="0" y="0"/>
+            <a:ext cx="5760640" cy="769441"/>
+          </a:xfrm>
+          <a:prstGeom prst="rect">
+            <a:avLst/>
+          </a:prstGeom>
+          <a:noFill/>
+        </p:spPr>
+        <p:txBody>
+          <a:bodyPr wrap="square" rtlCol="0">
+            <a:spAutoFit/>
+          </a:bodyPr>
+          <a:lstStyle/>
+          <a:p>
+            <a:r>
+              <a:rPr lang="en-US" sz="4400" dirty="0" err="1" smtClean="0">
+                <a:solidFill>
+                  <a:srgbClr val="20272A"/>
+                </a:solidFill>
+                <a:latin typeface="Arial" pitchFamily="34" charset="0"/>
+                <a:ea typeface="KaiTi" pitchFamily="49" charset="-122"/>
+                <a:cs typeface="Arial" pitchFamily="34" charset="0"/>
+              </a:rPr>
+              <a:t>Možnosti</a:t>
+            </a:r>
+            <a:r>
+              <a:rPr lang="en-US" sz="4400" dirty="0" smtClean="0">
+                <a:solidFill>
+                  <a:srgbClr val="20272A"/>
+                </a:solidFill>
+                <a:latin typeface="Arial" pitchFamily="34" charset="0"/>
+                <a:ea typeface="KaiTi" pitchFamily="49" charset="-122"/>
+                <a:cs typeface="Arial" pitchFamily="34" charset="0"/>
+              </a:rPr>
+              <a:t> </a:t>
+            </a:r>
+            <a:r>
+              <a:rPr lang="en-US" sz="4400" dirty="0" err="1" smtClean="0">
+                <a:solidFill>
+                  <a:srgbClr val="20272A"/>
+                </a:solidFill>
+                <a:latin typeface="Arial" pitchFamily="34" charset="0"/>
+                <a:ea typeface="KaiTi" pitchFamily="49" charset="-122"/>
+                <a:cs typeface="Arial" pitchFamily="34" charset="0"/>
+              </a:rPr>
+              <a:t>tvorby</a:t>
+            </a:r>
+            <a:r>
+              <a:rPr lang="en-US" sz="4400" dirty="0" smtClean="0">
+                <a:solidFill>
+                  <a:srgbClr val="20272A"/>
+                </a:solidFill>
+                <a:latin typeface="Arial" pitchFamily="34" charset="0"/>
+                <a:ea typeface="KaiTi" pitchFamily="49" charset="-122"/>
+                <a:cs typeface="Arial" pitchFamily="34" charset="0"/>
+              </a:rPr>
+              <a:t>    </a:t>
+            </a:r>
+            <a:endParaRPr lang="en-US" sz="2800" dirty="0" smtClean="0">
+              <a:solidFill>
+                <a:srgbClr val="20272A"/>
+              </a:solidFill>
+              <a:latin typeface="Arial" pitchFamily="34" charset="0"/>
+              <a:ea typeface="KaiTi" pitchFamily="49" charset="-122"/>
+              <a:cs typeface="Arial" pitchFamily="34" charset="0"/>
+            </a:endParaRPr>
+          </a:p>
+        </p:txBody>
+      </p:sp>
+      <p:sp>
+        <p:nvSpPr>
+          <p:cNvPr id="3" name="BlokTextu 2"/>
+          <p:cNvSpPr txBox="1"/>
+          <p:nvPr/>
+        </p:nvSpPr>
+        <p:spPr>
+          <a:xfrm>
+            <a:off x="2411760" y="411510"/>
+            <a:ext cx="6228184" cy="923330"/>
+          </a:xfrm>
+          <a:prstGeom prst="rect">
+            <a:avLst/>
+          </a:prstGeom>
+          <a:noFill/>
+        </p:spPr>
+        <p:txBody>
+          <a:bodyPr wrap="square" rtlCol="0">
+            <a:spAutoFit/>
+          </a:bodyPr>
+          <a:lstStyle/>
+          <a:p>
+            <a:r>
+              <a:rPr lang="en-US" sz="5400" b="1" dirty="0" smtClean="0">
+                <a:solidFill>
+                  <a:srgbClr val="851019"/>
+                </a:solidFill>
+                <a:latin typeface="Arial" pitchFamily="34" charset="0"/>
+                <a:ea typeface="KaiTi" pitchFamily="49" charset="-122"/>
+                <a:cs typeface="Arial" pitchFamily="34" charset="0"/>
+              </a:rPr>
+              <a:t> </a:t>
+            </a:r>
+            <a:r>
+              <a:rPr lang="en-US" sz="4800" b="1" dirty="0" err="1" smtClean="0">
+                <a:solidFill>
+                  <a:srgbClr val="851019"/>
+                </a:solidFill>
+                <a:latin typeface="Arial" pitchFamily="34" charset="0"/>
+                <a:ea typeface="KaiTi" pitchFamily="49" charset="-122"/>
+                <a:cs typeface="Arial" pitchFamily="34" charset="0"/>
+              </a:rPr>
+              <a:t>systémov</a:t>
+            </a:r>
+            <a:r>
+              <a:rPr lang="en-US" sz="4800" b="1" dirty="0" smtClean="0">
+                <a:solidFill>
+                  <a:srgbClr val="851019"/>
+                </a:solidFill>
+                <a:latin typeface="Arial" pitchFamily="34" charset="0"/>
+                <a:ea typeface="KaiTi" pitchFamily="49" charset="-122"/>
+                <a:cs typeface="Arial" pitchFamily="34" charset="0"/>
+              </a:rPr>
+              <a:t> v JEES  </a:t>
+            </a:r>
+            <a:endParaRPr lang="sk-SK" sz="5400" b="1" dirty="0">
+              <a:solidFill>
+                <a:srgbClr val="851019"/>
+              </a:solidFill>
+              <a:latin typeface="Arial" pitchFamily="34" charset="0"/>
+              <a:ea typeface="KaiTi" pitchFamily="49" charset="-122"/>
+              <a:cs typeface="Arial" pitchFamily="34" charset="0"/>
+            </a:endParaRPr>
+          </a:p>
+        </p:txBody>
+      </p:sp>
+      <p:sp>
+        <p:nvSpPr>
+          <p:cNvPr id="4" name="BlokTextu 3"/>
+          <p:cNvSpPr txBox="1"/>
+          <p:nvPr/>
+        </p:nvSpPr>
+        <p:spPr>
+          <a:xfrm>
+            <a:off x="179512" y="1419622"/>
+            <a:ext cx="8964488" cy="4385816"/>
+          </a:xfrm>
+          <a:prstGeom prst="rect">
+            <a:avLst/>
+          </a:prstGeom>
+          <a:noFill/>
+        </p:spPr>
+        <p:txBody>
+          <a:bodyPr wrap="square" rtlCol="0">
+            <a:spAutoFit/>
+          </a:bodyPr>
+          <a:lstStyle/>
+          <a:p>
+            <a:pPr marL="457200" lvl="0" indent="-457200"/>
+            <a:r>
+              <a:rPr lang="en-US" sz="2100" dirty="0" smtClean="0">
+                <a:latin typeface="Arial" pitchFamily="34" charset="0"/>
+                <a:cs typeface="Arial" pitchFamily="34" charset="0"/>
+              </a:rPr>
+              <a:t>1. </a:t>
+            </a:r>
+            <a:r>
+              <a:rPr lang="sk-SK" sz="2100" dirty="0" smtClean="0">
+                <a:latin typeface="Arial" pitchFamily="34" charset="0"/>
+                <a:cs typeface="Arial" pitchFamily="34" charset="0"/>
+              </a:rPr>
+              <a:t>Čistý JESS systém, bez použitia Java kódu</a:t>
+            </a:r>
+            <a:endParaRPr lang="en-US" sz="2100" dirty="0" smtClean="0">
+              <a:latin typeface="Arial" pitchFamily="34" charset="0"/>
+              <a:cs typeface="Arial" pitchFamily="34" charset="0"/>
+            </a:endParaRPr>
+          </a:p>
+          <a:p>
+            <a:pPr marL="457200" lvl="0" indent="-457200"/>
+            <a:endParaRPr lang="sk-SK" sz="1400" dirty="0" smtClean="0">
+              <a:latin typeface="Arial" pitchFamily="34" charset="0"/>
+              <a:cs typeface="Arial" pitchFamily="34" charset="0"/>
+            </a:endParaRPr>
+          </a:p>
+          <a:p>
+            <a:pPr lvl="0"/>
+            <a:r>
+              <a:rPr lang="en-US" sz="2100" dirty="0" smtClean="0">
+                <a:latin typeface="Arial" pitchFamily="34" charset="0"/>
+                <a:cs typeface="Arial" pitchFamily="34" charset="0"/>
+              </a:rPr>
+              <a:t>2. </a:t>
+            </a:r>
+            <a:r>
+              <a:rPr lang="sk-SK" sz="2100" dirty="0" smtClean="0">
+                <a:latin typeface="Arial" pitchFamily="34" charset="0"/>
+                <a:cs typeface="Arial" pitchFamily="34" charset="0"/>
+              </a:rPr>
+              <a:t>Čistý JESS systém, s prístupom do Java API</a:t>
+            </a:r>
+            <a:endParaRPr lang="en-US" sz="2100" dirty="0" smtClean="0">
+              <a:latin typeface="Arial" pitchFamily="34" charset="0"/>
+              <a:cs typeface="Arial" pitchFamily="34" charset="0"/>
+            </a:endParaRPr>
+          </a:p>
+          <a:p>
+            <a:pPr lvl="0"/>
+            <a:endParaRPr lang="sk-SK" sz="1400" dirty="0" smtClean="0">
+              <a:latin typeface="Arial" pitchFamily="34" charset="0"/>
+              <a:cs typeface="Arial" pitchFamily="34" charset="0"/>
+            </a:endParaRPr>
+          </a:p>
+          <a:p>
+            <a:pPr lvl="0"/>
+            <a:r>
+              <a:rPr lang="en-US" sz="2100" dirty="0" smtClean="0">
+                <a:latin typeface="Arial" pitchFamily="34" charset="0"/>
+                <a:cs typeface="Arial" pitchFamily="34" charset="0"/>
+              </a:rPr>
+              <a:t>3. </a:t>
+            </a:r>
+            <a:r>
+              <a:rPr lang="sk-SK" sz="2100" dirty="0" smtClean="0">
+                <a:latin typeface="Arial" pitchFamily="34" charset="0"/>
+                <a:cs typeface="Arial" pitchFamily="34" charset="0"/>
+              </a:rPr>
+              <a:t>Väčšina v JESS, v Jave napísaných zopár upravených JESS príkazov</a:t>
+            </a:r>
+            <a:endParaRPr lang="en-US" sz="2100" dirty="0" smtClean="0">
+              <a:latin typeface="Arial" pitchFamily="34" charset="0"/>
+              <a:cs typeface="Arial" pitchFamily="34" charset="0"/>
+            </a:endParaRPr>
+          </a:p>
+          <a:p>
+            <a:pPr lvl="0"/>
+            <a:endParaRPr lang="sk-SK" sz="1400" dirty="0" smtClean="0">
+              <a:latin typeface="Arial" pitchFamily="34" charset="0"/>
+              <a:cs typeface="Arial" pitchFamily="34" charset="0"/>
+            </a:endParaRPr>
+          </a:p>
+          <a:p>
+            <a:pPr lvl="0"/>
+            <a:r>
+              <a:rPr lang="en-US" sz="2100" dirty="0" smtClean="0">
+                <a:latin typeface="Arial" pitchFamily="34" charset="0"/>
+                <a:cs typeface="Arial" pitchFamily="34" charset="0"/>
+              </a:rPr>
+              <a:t>4. </a:t>
+            </a:r>
+            <a:r>
+              <a:rPr lang="sk-SK" sz="2100" dirty="0" smtClean="0">
+                <a:latin typeface="Arial" pitchFamily="34" charset="0"/>
+                <a:cs typeface="Arial" pitchFamily="34" charset="0"/>
+              </a:rPr>
+              <a:t>Polovica v JESS, podstatná časť v Jave</a:t>
+            </a:r>
+            <a:r>
+              <a:rPr lang="en-US" sz="2100" dirty="0" smtClean="0">
+                <a:latin typeface="Arial" pitchFamily="34" charset="0"/>
+                <a:cs typeface="Arial" pitchFamily="34" charset="0"/>
+              </a:rPr>
+              <a:t>, </a:t>
+            </a:r>
+            <a:r>
+              <a:rPr lang="sk-SK" sz="2100" i="1" dirty="0" err="1" smtClean="0">
+                <a:latin typeface="Arial" pitchFamily="34" charset="0"/>
+                <a:cs typeface="Arial" pitchFamily="34" charset="0"/>
+              </a:rPr>
+              <a:t>main</a:t>
+            </a:r>
+            <a:r>
+              <a:rPr lang="sk-SK" sz="2100" i="1" dirty="0" smtClean="0">
+                <a:latin typeface="Arial" pitchFamily="34" charset="0"/>
+                <a:cs typeface="Arial" pitchFamily="34" charset="0"/>
+              </a:rPr>
+              <a:t>()</a:t>
+            </a:r>
+            <a:r>
+              <a:rPr lang="sk-SK" sz="2100" dirty="0" smtClean="0">
+                <a:latin typeface="Arial" pitchFamily="34" charset="0"/>
+                <a:cs typeface="Arial" pitchFamily="34" charset="0"/>
+              </a:rPr>
+              <a:t> funkcia je v JESS</a:t>
+            </a:r>
+            <a:endParaRPr lang="en-US" sz="2100" dirty="0" smtClean="0">
+              <a:latin typeface="Arial" pitchFamily="34" charset="0"/>
+              <a:cs typeface="Arial" pitchFamily="34" charset="0"/>
+            </a:endParaRPr>
+          </a:p>
+          <a:p>
+            <a:pPr lvl="0"/>
+            <a:endParaRPr lang="sk-SK" sz="1400" dirty="0" smtClean="0">
+              <a:latin typeface="Arial" pitchFamily="34" charset="0"/>
+              <a:cs typeface="Arial" pitchFamily="34" charset="0"/>
+            </a:endParaRPr>
+          </a:p>
+          <a:p>
+            <a:pPr lvl="0"/>
+            <a:r>
+              <a:rPr lang="en-US" sz="2100" dirty="0" smtClean="0">
+                <a:latin typeface="Arial" pitchFamily="34" charset="0"/>
+                <a:cs typeface="Arial" pitchFamily="34" charset="0"/>
+              </a:rPr>
+              <a:t>5. </a:t>
+            </a:r>
+            <a:r>
+              <a:rPr lang="sk-SK" sz="2100" dirty="0" smtClean="0">
+                <a:latin typeface="Arial" pitchFamily="34" charset="0"/>
+                <a:cs typeface="Arial" pitchFamily="34" charset="0"/>
+              </a:rPr>
+              <a:t>Ako predchádzajúce, ale </a:t>
+            </a:r>
+            <a:r>
+              <a:rPr lang="sk-SK" sz="2100" i="1" dirty="0" err="1" smtClean="0">
+                <a:latin typeface="Arial" pitchFamily="34" charset="0"/>
+                <a:cs typeface="Arial" pitchFamily="34" charset="0"/>
+              </a:rPr>
+              <a:t>main</a:t>
+            </a:r>
+            <a:r>
+              <a:rPr lang="sk-SK" sz="2100" i="1" dirty="0" smtClean="0">
+                <a:latin typeface="Arial" pitchFamily="34" charset="0"/>
+                <a:cs typeface="Arial" pitchFamily="34" charset="0"/>
+              </a:rPr>
+              <a:t>()</a:t>
+            </a:r>
+            <a:r>
+              <a:rPr lang="sk-SK" sz="2100" dirty="0" smtClean="0">
+                <a:latin typeface="Arial" pitchFamily="34" charset="0"/>
+                <a:cs typeface="Arial" pitchFamily="34" charset="0"/>
+              </a:rPr>
+              <a:t> je v Jave</a:t>
+            </a:r>
+            <a:endParaRPr lang="en-US" sz="2100" dirty="0" smtClean="0">
+              <a:latin typeface="Arial" pitchFamily="34" charset="0"/>
+              <a:cs typeface="Arial" pitchFamily="34" charset="0"/>
+            </a:endParaRPr>
+          </a:p>
+          <a:p>
+            <a:pPr lvl="0"/>
+            <a:endParaRPr lang="sk-SK" sz="1400" dirty="0" smtClean="0">
+              <a:latin typeface="Arial" pitchFamily="34" charset="0"/>
+              <a:cs typeface="Arial" pitchFamily="34" charset="0"/>
+            </a:endParaRPr>
+          </a:p>
+          <a:p>
+            <a:pPr lvl="0"/>
+            <a:r>
+              <a:rPr lang="en-US" sz="2100" dirty="0" smtClean="0">
+                <a:solidFill>
+                  <a:srgbClr val="851019"/>
+                </a:solidFill>
+                <a:latin typeface="Arial" pitchFamily="34" charset="0"/>
+                <a:cs typeface="Arial" pitchFamily="34" charset="0"/>
+              </a:rPr>
+              <a:t>6. </a:t>
+            </a:r>
+            <a:r>
+              <a:rPr lang="sk-SK" sz="2100" dirty="0" smtClean="0">
+                <a:solidFill>
+                  <a:srgbClr val="851019"/>
+                </a:solidFill>
+                <a:latin typeface="Arial" pitchFamily="34" charset="0"/>
+                <a:cs typeface="Arial" pitchFamily="34" charset="0"/>
+              </a:rPr>
+              <a:t>Väčšina v Jave, načítava JESS kód v </a:t>
+            </a:r>
+            <a:r>
+              <a:rPr lang="sk-SK" sz="2100" dirty="0" err="1" smtClean="0">
+                <a:solidFill>
+                  <a:srgbClr val="851019"/>
+                </a:solidFill>
+                <a:latin typeface="Arial" pitchFamily="34" charset="0"/>
+                <a:cs typeface="Arial" pitchFamily="34" charset="0"/>
+              </a:rPr>
+              <a:t>runtime</a:t>
+            </a:r>
+            <a:endParaRPr lang="en-US" sz="2100" dirty="0" smtClean="0">
+              <a:solidFill>
+                <a:srgbClr val="851019"/>
+              </a:solidFill>
+              <a:latin typeface="Arial" pitchFamily="34" charset="0"/>
+              <a:cs typeface="Arial" pitchFamily="34" charset="0"/>
+            </a:endParaRPr>
+          </a:p>
+          <a:p>
+            <a:pPr lvl="0"/>
+            <a:endParaRPr lang="sk-SK" sz="1400" dirty="0" smtClean="0">
+              <a:latin typeface="Arial" pitchFamily="34" charset="0"/>
+              <a:cs typeface="Arial" pitchFamily="34" charset="0"/>
+            </a:endParaRPr>
+          </a:p>
+          <a:p>
+            <a:pPr lvl="0"/>
+            <a:r>
+              <a:rPr lang="en-US" sz="2100" dirty="0" smtClean="0">
+                <a:latin typeface="Arial" pitchFamily="34" charset="0"/>
+                <a:cs typeface="Arial" pitchFamily="34" charset="0"/>
+              </a:rPr>
+              <a:t>7. </a:t>
+            </a:r>
+            <a:r>
+              <a:rPr lang="sk-SK" sz="2100" dirty="0" smtClean="0">
+                <a:latin typeface="Arial" pitchFamily="34" charset="0"/>
+                <a:cs typeface="Arial" pitchFamily="34" charset="0"/>
+              </a:rPr>
+              <a:t>Čistý Java systém, ktorý pracuje s JESS iba cez Java API</a:t>
+            </a:r>
+          </a:p>
+          <a:p>
+            <a:r>
+              <a:rPr lang="en-US" sz="2400" dirty="0" smtClean="0">
+                <a:solidFill>
+                  <a:srgbClr val="20272A"/>
+                </a:solidFill>
+                <a:latin typeface="Arial" pitchFamily="34" charset="0"/>
+                <a:ea typeface="KaiTi" pitchFamily="49" charset="-122"/>
+                <a:cs typeface="Arial" pitchFamily="34" charset="0"/>
+              </a:rPr>
+              <a:t> </a:t>
+            </a:r>
+          </a:p>
+          <a:p>
+            <a:r>
+              <a:rPr lang="en-US" sz="2400" dirty="0" smtClean="0">
+                <a:solidFill>
+                  <a:srgbClr val="20272A"/>
+                </a:solidFill>
+                <a:latin typeface="Arial" pitchFamily="34" charset="0"/>
+                <a:ea typeface="KaiTi" pitchFamily="49" charset="-122"/>
+                <a:cs typeface="Arial" pitchFamily="34" charset="0"/>
+              </a:rPr>
+              <a:t> </a:t>
+            </a:r>
+            <a:endParaRPr lang="en-US" sz="1400" dirty="0" smtClean="0">
+              <a:solidFill>
+                <a:srgbClr val="20272A"/>
+              </a:solidFill>
+              <a:latin typeface="Arial" pitchFamily="34" charset="0"/>
+              <a:ea typeface="KaiTi" pitchFamily="49" charset="-122"/>
+              <a:cs typeface="Arial" pitchFamily="34" charset="0"/>
+            </a:endParaRPr>
+          </a:p>
+        </p:txBody>
+      </p:sp>
     </p:spTree>
   </p:cSld>
   <p:clrMapOvr>
     <a:masterClrMapping/>
   </p:clrMapOvr>
+  <p:transition spd="med">
+    <p:push/>
+  </p:transition>
   <p:timing>
     <p:tnLst>
       <p:par>
@@ -17241,6 +18475,9 @@
   <p:clrMapOvr>
     <a:masterClrMapping/>
   </p:clrMapOvr>
+  <p:transition spd="med">
+    <p:push/>
+  </p:transition>
   <p:timing>
     <p:tnLst>
       <p:par>
@@ -17302,21 +18539,30 @@
                             </p:childTnLst>
                           </p:cTn>
                         </p:par>
+                      </p:childTnLst>
+                    </p:cTn>
+                  </p:par>
+                  <p:par>
+                    <p:cTn id="8" fill="hold">
+                      <p:stCondLst>
+                        <p:cond delay="indefinite"/>
+                      </p:stCondLst>
+                      <p:childTnLst>
                         <p:par>
-                          <p:cTn id="8" fill="hold">
+                          <p:cTn id="9" fill="hold">
                             <p:stCondLst>
-                              <p:cond delay="500"/>
+                              <p:cond delay="0"/>
                             </p:stCondLst>
                             <p:childTnLst>
                               <p:par>
-                                <p:cTn id="9" presetID="12" presetClass="entr" presetSubtype="4" fill="hold" grpId="0" nodeType="afterEffect">
+                                <p:cTn id="10" presetID="12" presetClass="entr" presetSubtype="4" fill="hold" grpId="0" nodeType="clickEffect">
                                   <p:stCondLst>
                                     <p:cond delay="0"/>
                                   </p:stCondLst>
                                   <p:childTnLst>
                                     <p:set>
                                       <p:cBhvr>
-                                        <p:cTn id="10" dur="1" fill="hold">
+                                        <p:cTn id="11" dur="1" fill="hold">
                                           <p:stCondLst>
                                             <p:cond delay="0"/>
                                           </p:stCondLst>
@@ -17334,7 +18580,7 @@
                                     </p:set>
                                     <p:animEffect transition="in" filter="slide(fromBottom)">
                                       <p:cBhvr>
-                                        <p:cTn id="11" dur="500"/>
+                                        <p:cTn id="12" dur="500"/>
                                         <p:tgtEl>
                                           <p:spTgt spid="7"/>
                                         </p:tgtEl>

</xml_diff>